<commit_message>
update source github in powerpoint
</commit_message>
<xml_diff>
--- a/Translator on cloud.pptx
+++ b/Translator on cloud.pptx
@@ -7498,10 +7498,29 @@
           </a:p>
           <a:p>
             <a:r>
-              <a:rPr lang="en-US" smtClean="0">
+              <a:rPr lang="en-US" dirty="0" smtClean="0">
                 <a:hlinkClick r:id="rId6"/>
               </a:rPr>
-              <a:t>Change default runtime handler</a:t>
+              <a:t>Change default runtime </a:t>
+            </a:r>
+            <a:r>
+              <a:rPr lang="en-US" dirty="0" smtClean="0">
+                <a:hlinkClick r:id="rId6"/>
+              </a:rPr>
+              <a:t>handler</a:t>
+            </a:r>
+            <a:endParaRPr lang="en-US" dirty="0" smtClean="0"/>
+          </a:p>
+          <a:p>
+            <a:r>
+              <a:rPr lang="en-US" dirty="0" smtClean="0"/>
+              <a:t>Source:  </a:t>
+            </a:r>
+            <a:r>
+              <a:rPr lang="en-US" dirty="0" err="1" smtClean="0">
+                <a:hlinkClick r:id="rId7"/>
+              </a:rPr>
+              <a:t>Github</a:t>
             </a:r>
             <a:endParaRPr lang="en-US" dirty="0"/>
           </a:p>

</xml_diff>